<commit_message>
Proposal presentation updated with bulletpoints
</commit_message>
<xml_diff>
--- a/Proposal_Presentation.pptx
+++ b/Proposal_Presentation.pptx
@@ -25,16 +25,20 @@
   <p:notesSz cx="6858000" cy="9144000"/>
   <p:embeddedFontLst>
     <p:embeddedFont>
-      <p:font typeface="Source Sans Pro" panose="020B0604020202020204" charset="0"/>
+      <p:font typeface="Arial Rounded MT Bold" panose="020F0704030504030204" pitchFamily="34" charset="0"/>
       <p:regular r:id="rId15"/>
-      <p:bold r:id="rId16"/>
-      <p:italic r:id="rId17"/>
-      <p:boldItalic r:id="rId18"/>
     </p:embeddedFont>
     <p:embeddedFont>
-      <p:font typeface="Oswald" panose="020B0604020202020204" charset="0"/>
-      <p:regular r:id="rId19"/>
-      <p:bold r:id="rId20"/>
+      <p:font typeface="Oswald" panose="00000500000000000000" pitchFamily="2" charset="0"/>
+      <p:regular r:id="rId16"/>
+      <p:bold r:id="rId17"/>
+    </p:embeddedFont>
+    <p:embeddedFont>
+      <p:font typeface="Source Sans Pro" panose="020B0503030403020204" pitchFamily="34" charset="0"/>
+      <p:regular r:id="rId18"/>
+      <p:bold r:id="rId19"/>
+      <p:italic r:id="rId20"/>
+      <p:boldItalic r:id="rId21"/>
     </p:embeddedFont>
   </p:embeddedFontLst>
   <p:defaultTextStyle>
@@ -1120,7 +1124,7 @@
               <a:buNone/>
             </a:pPr>
             <a:r>
-              <a:rPr lang="en-US" dirty="0" smtClean="0"/>
+              <a:rPr lang="en-US" dirty="0"/>
               <a:t>Took our inspiration ~_~</a:t>
             </a:r>
             <a:endParaRPr dirty="0"/>
@@ -11281,7 +11285,7 @@
               <a:buNone/>
             </a:pPr>
             <a:r>
-              <a:rPr lang="en-US" dirty="0" smtClean="0"/>
+              <a:rPr lang="en-US" dirty="0"/>
               <a:t>Family App</a:t>
             </a:r>
             <a:endParaRPr dirty="0"/>
@@ -11293,18 +11297,6 @@
   <p:clrMapOvr>
     <a:masterClrMapping/>
   </p:clrMapOvr>
-  <mc:AlternateContent xmlns:mc="http://schemas.openxmlformats.org/markup-compatibility/2006">
-    <mc:Choice xmlns:p14="http://schemas.microsoft.com/office/powerpoint/2010/main" Requires="p14">
-      <p:transition spd="slow" p14:dur="3400">
-        <p14:reveal/>
-      </p:transition>
-    </mc:Choice>
-    <mc:Fallback>
-      <p:transition spd="slow">
-        <p:fade/>
-      </p:transition>
-    </mc:Fallback>
-  </mc:AlternateContent>
 </p:sld>
 </file>
 
@@ -11346,10 +11338,9 @@
           <a:lstStyle/>
           <a:p>
             <a:r>
-              <a:rPr lang="en-US" dirty="0" smtClean="0"/>
+              <a:rPr lang="en-US" dirty="0"/>
               <a:t>Tentative Timeline</a:t>
             </a:r>
-            <a:endParaRPr lang="en-US" dirty="0"/>
           </a:p>
         </p:txBody>
       </p:sp>
@@ -11377,7 +11368,7 @@
               <a:buNone/>
             </a:pPr>
             <a:r>
-              <a:rPr lang="en-US" sz="1000" dirty="0" smtClean="0"/>
+              <a:rPr lang="en-US" sz="1000" dirty="0"/>
               <a:t>We will try to work according </a:t>
             </a:r>
           </a:p>
@@ -11386,10 +11377,9 @@
               <a:buNone/>
             </a:pPr>
             <a:r>
-              <a:rPr lang="en-US" sz="1000" dirty="0" smtClean="0"/>
+              <a:rPr lang="en-US" sz="1000" dirty="0"/>
               <a:t>To this timeline:</a:t>
             </a:r>
-            <a:endParaRPr lang="en-US" sz="1000" dirty="0"/>
           </a:p>
         </p:txBody>
       </p:sp>
@@ -11473,18 +11463,13 @@
                     <a:p>
                       <a:pPr algn="ctr"/>
                       <a:r>
-                        <a:rPr lang="en-US" sz="1000" dirty="0" smtClean="0">
+                        <a:rPr lang="en-US" sz="1000" dirty="0">
                           <a:solidFill>
                             <a:srgbClr val="FF0000"/>
                           </a:solidFill>
                         </a:rPr>
                         <a:t>Task</a:t>
                       </a:r>
-                      <a:endParaRPr lang="en-US" sz="1000" dirty="0">
-                        <a:solidFill>
-                          <a:srgbClr val="FF0000"/>
-                        </a:solidFill>
-                      </a:endParaRPr>
                     </a:p>
                   </a:txBody>
                   <a:tcPr/>
@@ -11496,18 +11481,13 @@
                     <a:p>
                       <a:pPr algn="ctr"/>
                       <a:r>
-                        <a:rPr lang="en-US" sz="1000" dirty="0" smtClean="0">
+                        <a:rPr lang="en-US" sz="1000" dirty="0">
                           <a:solidFill>
                             <a:srgbClr val="FF0000"/>
                           </a:solidFill>
                         </a:rPr>
                         <a:t>Timeline</a:t>
                       </a:r>
-                      <a:endParaRPr lang="en-US" sz="1000" dirty="0">
-                        <a:solidFill>
-                          <a:srgbClr val="FF0000"/>
-                        </a:solidFill>
-                      </a:endParaRPr>
                     </a:p>
                   </a:txBody>
                   <a:tcPr/>
@@ -11526,10 +11506,9 @@
                     <a:p>
                       <a:pPr algn="ctr"/>
                       <a:r>
-                        <a:rPr lang="en-US" sz="1000" dirty="0" smtClean="0"/>
+                        <a:rPr lang="en-US" sz="1000" dirty="0"/>
                         <a:t>Idea</a:t>
                       </a:r>
-                      <a:endParaRPr lang="en-US" sz="1000" dirty="0"/>
                     </a:p>
                   </a:txBody>
                   <a:tcPr/>
@@ -11541,10 +11520,9 @@
                     <a:p>
                       <a:pPr algn="ctr"/>
                       <a:r>
-                        <a:rPr lang="en-US" sz="1000" dirty="0" smtClean="0"/>
+                        <a:rPr lang="en-US" sz="1000" dirty="0"/>
                         <a:t>27.10.21-03.11.21</a:t>
                       </a:r>
-                      <a:endParaRPr lang="en-US" sz="1000" dirty="0"/>
                     </a:p>
                   </a:txBody>
                   <a:tcPr/>
@@ -11563,10 +11541,9 @@
                     <a:p>
                       <a:pPr algn="ctr"/>
                       <a:r>
-                        <a:rPr lang="en-US" sz="1000" dirty="0" smtClean="0"/>
+                        <a:rPr lang="en-US" sz="1000" dirty="0"/>
                         <a:t>Presentation</a:t>
                       </a:r>
-                      <a:endParaRPr lang="en-US" sz="1000" dirty="0"/>
                     </a:p>
                   </a:txBody>
                   <a:tcPr/>
@@ -11578,10 +11555,9 @@
                     <a:p>
                       <a:pPr algn="ctr"/>
                       <a:r>
-                        <a:rPr lang="en-US" sz="1000" dirty="0" smtClean="0"/>
+                        <a:rPr lang="en-US" sz="1000" dirty="0"/>
                         <a:t>03.11.21-10.11.21</a:t>
                       </a:r>
-                      <a:endParaRPr lang="en-US" sz="1000" dirty="0"/>
                     </a:p>
                   </a:txBody>
                   <a:tcPr/>
@@ -11600,10 +11576,9 @@
                     <a:p>
                       <a:pPr algn="ctr"/>
                       <a:r>
-                        <a:rPr lang="en-US" sz="1000" dirty="0" smtClean="0"/>
+                        <a:rPr lang="en-US" sz="1000" dirty="0"/>
                         <a:t>Proposal </a:t>
                       </a:r>
-                      <a:endParaRPr lang="en-US" sz="1000" dirty="0"/>
                     </a:p>
                   </a:txBody>
                   <a:tcPr/>
@@ -11615,10 +11590,9 @@
                     <a:p>
                       <a:pPr algn="ctr"/>
                       <a:r>
-                        <a:rPr lang="en-US" sz="1000" dirty="0" smtClean="0"/>
+                        <a:rPr lang="en-US" sz="1000" dirty="0"/>
                         <a:t>10.11.21-17.11.21</a:t>
                       </a:r>
-                      <a:endParaRPr lang="en-US" sz="1000" dirty="0"/>
                     </a:p>
                   </a:txBody>
                   <a:tcPr/>
@@ -11637,10 +11611,9 @@
                     <a:p>
                       <a:pPr algn="ctr"/>
                       <a:r>
-                        <a:rPr lang="en-US" sz="1000" dirty="0" smtClean="0"/>
+                        <a:rPr lang="en-US" sz="1000" dirty="0"/>
                         <a:t>Database</a:t>
                       </a:r>
-                      <a:endParaRPr lang="en-US" sz="1000" dirty="0"/>
                     </a:p>
                   </a:txBody>
                   <a:tcPr/>
@@ -11652,10 +11625,9 @@
                     <a:p>
                       <a:pPr algn="ctr"/>
                       <a:r>
-                        <a:rPr lang="en-US" sz="1000" dirty="0" smtClean="0"/>
+                        <a:rPr lang="en-US" sz="1000" dirty="0"/>
                         <a:t>17.11.21-24.11.21</a:t>
                       </a:r>
-                      <a:endParaRPr lang="en-US" sz="1000" dirty="0"/>
                     </a:p>
                   </a:txBody>
                   <a:tcPr/>
@@ -11674,10 +11646,9 @@
                     <a:p>
                       <a:pPr algn="ctr"/>
                       <a:r>
-                        <a:rPr lang="en-US" sz="1000" dirty="0" smtClean="0"/>
+                        <a:rPr lang="en-US" sz="1000" dirty="0"/>
                         <a:t>Chat</a:t>
                       </a:r>
-                      <a:endParaRPr lang="en-US" sz="1000" dirty="0"/>
                     </a:p>
                   </a:txBody>
                   <a:tcPr/>
@@ -11689,10 +11660,9 @@
                     <a:p>
                       <a:pPr algn="ctr"/>
                       <a:r>
-                        <a:rPr lang="en-US" sz="1000" dirty="0" smtClean="0"/>
+                        <a:rPr lang="en-US" sz="1000" dirty="0"/>
                         <a:t>24.11.21-01.12.21</a:t>
                       </a:r>
-                      <a:endParaRPr lang="en-US" sz="1000" dirty="0"/>
                     </a:p>
                   </a:txBody>
                   <a:tcPr/>
@@ -11711,10 +11681,9 @@
                     <a:p>
                       <a:pPr algn="ctr"/>
                       <a:r>
-                        <a:rPr lang="en-US" sz="1000" dirty="0" smtClean="0"/>
+                        <a:rPr lang="en-US" sz="1000" dirty="0"/>
                         <a:t>To-Do Tasks</a:t>
                       </a:r>
-                      <a:endParaRPr lang="en-US" sz="1000" dirty="0"/>
                     </a:p>
                   </a:txBody>
                   <a:tcPr/>
@@ -11726,10 +11695,9 @@
                     <a:p>
                       <a:pPr algn="ctr"/>
                       <a:r>
-                        <a:rPr lang="en-US" sz="1000" dirty="0" smtClean="0"/>
+                        <a:rPr lang="en-US" sz="1000" dirty="0"/>
                         <a:t>01.12.21-08.12.21</a:t>
                       </a:r>
-                      <a:endParaRPr lang="en-US" sz="1000" dirty="0"/>
                     </a:p>
                   </a:txBody>
                   <a:tcPr/>
@@ -11748,10 +11716,9 @@
                     <a:p>
                       <a:pPr algn="ctr"/>
                       <a:r>
-                        <a:rPr lang="en-US" sz="1000" dirty="0" smtClean="0"/>
+                        <a:rPr lang="en-US" sz="1000" dirty="0"/>
                         <a:t>Live Location</a:t>
                       </a:r>
-                      <a:endParaRPr lang="en-US" sz="1000" dirty="0"/>
                     </a:p>
                   </a:txBody>
                   <a:tcPr/>
@@ -11763,10 +11730,9 @@
                     <a:p>
                       <a:pPr algn="ctr"/>
                       <a:r>
-                        <a:rPr lang="en-US" sz="1000" dirty="0" smtClean="0"/>
+                        <a:rPr lang="en-US" sz="1000" dirty="0"/>
                         <a:t>08.12.21-15.12.21</a:t>
                       </a:r>
-                      <a:endParaRPr lang="en-US" sz="1000" dirty="0"/>
                     </a:p>
                   </a:txBody>
                   <a:tcPr/>
@@ -11785,11 +11751,11 @@
                     <a:p>
                       <a:pPr algn="ctr"/>
                       <a:r>
-                        <a:rPr lang="en-US" sz="1000" dirty="0" smtClean="0"/>
+                        <a:rPr lang="en-US" sz="1000" dirty="0"/>
                         <a:t>Last Active</a:t>
                       </a:r>
                       <a:r>
-                        <a:rPr lang="en-US" sz="1000" baseline="0" dirty="0" smtClean="0"/>
+                        <a:rPr lang="en-US" sz="1000" baseline="0" dirty="0"/>
                         <a:t> Status</a:t>
                       </a:r>
                       <a:endParaRPr lang="en-US" sz="1000" dirty="0"/>
@@ -11804,10 +11770,9 @@
                     <a:p>
                       <a:pPr algn="ctr"/>
                       <a:r>
-                        <a:rPr lang="en-US" sz="1000" dirty="0" smtClean="0"/>
+                        <a:rPr lang="en-US" sz="1000" dirty="0"/>
                         <a:t>15.12.21-22.12.21</a:t>
                       </a:r>
-                      <a:endParaRPr lang="en-US" sz="1000" dirty="0"/>
                     </a:p>
                   </a:txBody>
                   <a:tcPr/>
@@ -11826,10 +11791,9 @@
                     <a:p>
                       <a:pPr algn="ctr"/>
                       <a:r>
-                        <a:rPr lang="en-US" sz="1000" dirty="0" smtClean="0"/>
+                        <a:rPr lang="en-US" sz="1000" dirty="0"/>
                         <a:t>Doc Storage Hub</a:t>
                       </a:r>
-                      <a:endParaRPr lang="en-US" sz="1000" dirty="0"/>
                     </a:p>
                   </a:txBody>
                   <a:tcPr/>
@@ -11841,10 +11805,9 @@
                     <a:p>
                       <a:pPr algn="ctr"/>
                       <a:r>
-                        <a:rPr lang="en-US" sz="1000" dirty="0" smtClean="0"/>
+                        <a:rPr lang="en-US" sz="1000" dirty="0"/>
                         <a:t>22.12.21-29.12.21</a:t>
                       </a:r>
-                      <a:endParaRPr lang="en-US" sz="1000" dirty="0"/>
                     </a:p>
                   </a:txBody>
                   <a:tcPr/>
@@ -11863,10 +11826,9 @@
                     <a:p>
                       <a:pPr algn="ctr"/>
                       <a:r>
-                        <a:rPr lang="en-US" sz="1000" dirty="0" smtClean="0"/>
+                        <a:rPr lang="en-US" sz="1000" dirty="0"/>
                         <a:t>Alert and Emergency</a:t>
                       </a:r>
-                      <a:endParaRPr lang="en-US" sz="1000" dirty="0"/>
                     </a:p>
                   </a:txBody>
                   <a:tcPr/>
@@ -11878,10 +11840,9 @@
                     <a:p>
                       <a:pPr algn="ctr"/>
                       <a:r>
-                        <a:rPr lang="en-US" sz="1000" dirty="0" smtClean="0"/>
+                        <a:rPr lang="en-US" sz="1000" dirty="0"/>
                         <a:t>29.12.21-05.01.22</a:t>
                       </a:r>
-                      <a:endParaRPr lang="en-US" sz="1000" dirty="0"/>
                     </a:p>
                   </a:txBody>
                   <a:tcPr/>
@@ -11900,11 +11861,11 @@
                     <a:p>
                       <a:pPr algn="ctr"/>
                       <a:r>
-                        <a:rPr lang="en-US" sz="1000" dirty="0" smtClean="0"/>
+                        <a:rPr lang="en-US" sz="1000" dirty="0"/>
                         <a:t>Presentation,</a:t>
                       </a:r>
                       <a:r>
-                        <a:rPr lang="en-US" sz="1000" baseline="0" dirty="0" smtClean="0"/>
+                        <a:rPr lang="en-US" sz="1000" baseline="0" dirty="0"/>
                         <a:t> Report and Delivery</a:t>
                       </a:r>
                       <a:endParaRPr lang="en-US" sz="1000" dirty="0"/>
@@ -11919,10 +11880,9 @@
                     <a:p>
                       <a:pPr algn="ctr"/>
                       <a:r>
-                        <a:rPr lang="en-US" sz="1000" dirty="0" smtClean="0"/>
+                        <a:rPr lang="en-US" sz="1000" dirty="0"/>
                         <a:t>05.01.22-12.01.22</a:t>
                       </a:r>
-                      <a:endParaRPr lang="en-US" sz="1000" dirty="0"/>
                     </a:p>
                   </a:txBody>
                   <a:tcPr/>
@@ -11947,25 +11907,6 @@
   <p:clrMapOvr>
     <a:masterClrMapping/>
   </p:clrMapOvr>
-  <mc:AlternateContent xmlns:mc="http://schemas.openxmlformats.org/markup-compatibility/2006">
-    <mc:Choice xmlns:p14="http://schemas.microsoft.com/office/powerpoint/2010/main" Requires="p14">
-      <p:transition spd="slow" p14:dur="3400">
-        <p14:reveal/>
-      </p:transition>
-    </mc:Choice>
-    <mc:Fallback>
-      <p:transition spd="slow">
-        <p:fade/>
-      </p:transition>
-    </mc:Fallback>
-  </mc:AlternateContent>
-  <p:timing>
-    <p:tnLst>
-      <p:par>
-        <p:cTn id="1" dur="indefinite" restart="never" nodeType="tmRoot"/>
-      </p:par>
-    </p:tnLst>
-  </p:timing>
 </p:sld>
 </file>
 
@@ -12007,10 +11948,9 @@
           <a:lstStyle/>
           <a:p>
             <a:r>
-              <a:rPr lang="en-US" dirty="0" smtClean="0"/>
+              <a:rPr lang="en-US" sz="2400" dirty="0"/>
               <a:t>Conclusion</a:t>
             </a:r>
-            <a:endParaRPr lang="en-US" dirty="0"/>
           </a:p>
         </p:txBody>
       </p:sp>
@@ -12034,59 +11974,110 @@
           <a:bodyPr/>
           <a:lstStyle/>
           <a:p>
-            <a:pPr marL="101600" indent="0" algn="just">
-              <a:buNone/>
+            <a:pPr algn="just">
+              <a:lnSpc>
+                <a:spcPct val="200000"/>
+              </a:lnSpc>
+              <a:buFont typeface="Wingdings" panose="05000000000000000000" pitchFamily="2" charset="2"/>
+              <a:buChar char="Ø"/>
             </a:pPr>
             <a:r>
-              <a:rPr lang="en-US" sz="1100" dirty="0"/>
-              <a:t>As the unprecedented growth of globalization continues to spread out its golden light through technology and powerful systems merging billions of users within a common net, it lays bare to many unexplored, untapped areas of attention - many which surpass from being a want, and pose to be a need </a:t>
+              <a:rPr lang="en-US" sz="1200" dirty="0">
+                <a:latin typeface="Arial Rounded MT Bold" panose="020F0704030504030204" pitchFamily="34" charset="0"/>
+              </a:rPr>
+              <a:t>Keeping up with the technology for Family.</a:t>
             </a:r>
+          </a:p>
+          <a:p>
+            <a:pPr algn="just">
+              <a:lnSpc>
+                <a:spcPct val="200000"/>
+              </a:lnSpc>
+              <a:buFont typeface="Wingdings" panose="05000000000000000000" pitchFamily="2" charset="2"/>
+              <a:buChar char="Ø"/>
+            </a:pPr>
             <a:r>
-              <a:rPr lang="en-US" sz="1100" dirty="0" smtClean="0"/>
-              <a:t>instead.</a:t>
+              <a:rPr lang="en-US" sz="1200" dirty="0">
+                <a:latin typeface="Arial Rounded MT Bold" panose="020F0704030504030204" pitchFamily="34" charset="0"/>
+              </a:rPr>
+              <a:t>Providing Security and tranquility of Family members.</a:t>
             </a:r>
+          </a:p>
+          <a:p>
+            <a:pPr algn="just">
+              <a:lnSpc>
+                <a:spcPct val="200000"/>
+              </a:lnSpc>
+              <a:buFont typeface="Wingdings" panose="05000000000000000000" pitchFamily="2" charset="2"/>
+              <a:buChar char="Ø"/>
+            </a:pPr>
+            <a:r>
+              <a:rPr lang="en-US" sz="1200" dirty="0">
+                <a:latin typeface="Arial Rounded MT Bold" panose="020F0704030504030204" pitchFamily="34" charset="0"/>
+              </a:rPr>
+              <a:t>Ease of Family tasks.</a:t>
+            </a:r>
+          </a:p>
+          <a:p>
+            <a:pPr algn="just">
+              <a:lnSpc>
+                <a:spcPct val="200000"/>
+              </a:lnSpc>
+              <a:buFont typeface="Wingdings" panose="05000000000000000000" pitchFamily="2" charset="2"/>
+              <a:buChar char="Ø"/>
+            </a:pPr>
+            <a:r>
+              <a:rPr lang="en-US" sz="1200" dirty="0">
+                <a:latin typeface="Arial Rounded MT Bold" panose="020F0704030504030204" pitchFamily="34" charset="0"/>
+              </a:rPr>
+              <a:t>Filling the void in the market.</a:t>
+            </a:r>
+          </a:p>
+          <a:p>
+            <a:pPr algn="just">
+              <a:buFont typeface="Wingdings" panose="05000000000000000000" pitchFamily="2" charset="2"/>
+              <a:buChar char="Ø"/>
+            </a:pPr>
+            <a:endParaRPr lang="en-US" sz="1200" dirty="0">
+              <a:latin typeface="Arial Rounded MT Bold" panose="020F0704030504030204" pitchFamily="34" charset="0"/>
+            </a:endParaRPr>
+          </a:p>
+          <a:p>
+            <a:pPr algn="just">
+              <a:buFont typeface="Wingdings" panose="05000000000000000000" pitchFamily="2" charset="2"/>
+              <a:buChar char="Ø"/>
+            </a:pPr>
+            <a:endParaRPr lang="en-US" sz="1200" dirty="0">
+              <a:latin typeface="Arial Rounded MT Bold" panose="020F0704030504030204" pitchFamily="34" charset="0"/>
+            </a:endParaRPr>
+          </a:p>
+          <a:p>
+            <a:pPr algn="just">
+              <a:buFont typeface="Wingdings" panose="05000000000000000000" pitchFamily="2" charset="2"/>
+              <a:buChar char="Ø"/>
+            </a:pPr>
+            <a:endParaRPr lang="en-US" sz="1200" dirty="0">
+              <a:latin typeface="Arial Rounded MT Bold" panose="020F0704030504030204" pitchFamily="34" charset="0"/>
+            </a:endParaRPr>
           </a:p>
           <a:p>
             <a:pPr marL="101600" indent="0" algn="just">
               <a:buNone/>
             </a:pPr>
-            <a:r>
-              <a:rPr lang="en-US" sz="1100" dirty="0"/>
-              <a:t>One of many such areas of potential remains to be the security and niche-specific security and communication</a:t>
-            </a:r>
-            <a:r>
-              <a:rPr lang="en-US" sz="1100" dirty="0" smtClean="0"/>
-              <a:t>.</a:t>
-            </a:r>
+            <a:endParaRPr lang="en-US" sz="1200" dirty="0">
+              <a:latin typeface="Arial Rounded MT Bold" panose="020F0704030504030204" pitchFamily="34" charset="0"/>
+            </a:endParaRPr>
           </a:p>
           <a:p>
-            <a:pPr marL="101600" indent="0" algn="just">
-              <a:buNone/>
+            <a:pPr algn="just">
+              <a:buFont typeface="Wingdings" panose="05000000000000000000" pitchFamily="2" charset="2"/>
+              <a:buChar char="Ø"/>
             </a:pPr>
             <a:r>
-              <a:rPr lang="en-US" sz="1100" dirty="0"/>
-              <a:t>Existing mainstream social platforms are still not offering the intuitive environment that a household needs for their daily, task-filled family routines. The waters are still not accommodating enough for the children because of the non-existing safety net in these platforms. Such a similar sentiment can be true for those parents who are using their smartphones for the very first time - or are less-versed in the knowledge of the graces of technology. Finding the right options in the right time to use the right features can feel like a breeze - which unfortunately the said platforms fail to yet deliver</a:t>
-            </a:r>
-            <a:r>
-              <a:rPr lang="en-US" sz="1100" dirty="0" smtClean="0"/>
-              <a:t>.</a:t>
-            </a:r>
-          </a:p>
-          <a:p>
-            <a:pPr marL="101600" indent="0" algn="just">
-              <a:buNone/>
-            </a:pPr>
-            <a:r>
-              <a:rPr lang="en-US" sz="1100" dirty="0"/>
-              <a:t>We hope </a:t>
-            </a:r>
-            <a:r>
-              <a:rPr lang="en-US" sz="1100" dirty="0" err="1"/>
-              <a:t>FamilyApp</a:t>
-            </a:r>
-            <a:r>
-              <a:rPr lang="en-US" sz="1100" dirty="0"/>
-              <a:t> delivers what it promises to families - an application posing as a simple, intuitive, user-friendly, safe-for-all platform, whilst behind the curtains, working with industry-standard frameworks, and effective, strong use of technology.</a:t>
+              <a:rPr lang="en-US" sz="1200" dirty="0">
+                <a:latin typeface="Arial Rounded MT Bold" panose="020F0704030504030204" pitchFamily="34" charset="0"/>
+              </a:rPr>
+              <a:t>We hope…</a:t>
             </a:r>
           </a:p>
         </p:txBody>
@@ -12133,25 +12124,6 @@
   <p:clrMapOvr>
     <a:masterClrMapping/>
   </p:clrMapOvr>
-  <mc:AlternateContent xmlns:mc="http://schemas.openxmlformats.org/markup-compatibility/2006">
-    <mc:Choice xmlns:p14="http://schemas.microsoft.com/office/powerpoint/2010/main" Requires="p14">
-      <p:transition spd="slow" p14:dur="3400">
-        <p14:reveal/>
-      </p:transition>
-    </mc:Choice>
-    <mc:Fallback>
-      <p:transition spd="slow">
-        <p:fade/>
-      </p:transition>
-    </mc:Fallback>
-  </mc:AlternateContent>
-  <p:timing>
-    <p:tnLst>
-      <p:par>
-        <p:cTn id="1" dur="indefinite" restart="never" nodeType="tmRoot"/>
-      </p:par>
-    </p:tnLst>
-  </p:timing>
 </p:sld>
 </file>
 
@@ -12207,10 +12179,10 @@
               <a:buNone/>
             </a:pPr>
             <a:r>
-              <a:rPr lang="en" sz="10000"/>
-              <a:t>THANKS!</a:t>
+              <a:rPr lang="en" sz="10000" dirty="0"/>
+              <a:t>Thank You</a:t>
             </a:r>
-            <a:endParaRPr sz="10000"/>
+            <a:endParaRPr sz="10000" dirty="0"/>
           </a:p>
         </p:txBody>
       </p:sp>
@@ -12315,25 +12287,6 @@
   <p:clrMapOvr>
     <a:masterClrMapping/>
   </p:clrMapOvr>
-  <mc:AlternateContent xmlns:mc="http://schemas.openxmlformats.org/markup-compatibility/2006">
-    <mc:Choice xmlns:p14="http://schemas.microsoft.com/office/powerpoint/2010/main" Requires="p14">
-      <p:transition spd="slow" p14:dur="3400">
-        <p14:reveal/>
-      </p:transition>
-    </mc:Choice>
-    <mc:Fallback>
-      <p:transition spd="slow">
-        <p:fade/>
-      </p:transition>
-    </mc:Fallback>
-  </mc:AlternateContent>
-  <p:timing>
-    <p:tnLst>
-      <p:par>
-        <p:cTn id="1" dur="indefinite" restart="never" nodeType="tmRoot"/>
-      </p:par>
-    </p:tnLst>
-  </p:timing>
 </p:sld>
 </file>
 
@@ -12431,7 +12384,7 @@
               <a:buNone/>
             </a:pPr>
             <a:r>
-              <a:rPr lang="en" sz="3600" b="1" dirty="0" smtClean="0"/>
+              <a:rPr lang="en" sz="3600" b="1" dirty="0"/>
               <a:t>We are</a:t>
             </a:r>
             <a:endParaRPr sz="3600" b="1" dirty="0"/>
@@ -12452,7 +12405,7 @@
               <a:buNone/>
             </a:pPr>
             <a:r>
-              <a:rPr lang="en-US" dirty="0" smtClean="0"/>
+              <a:rPr lang="en-US" dirty="0"/>
               <a:t>Md. Hasibur Rahman 1922040042</a:t>
             </a:r>
           </a:p>
@@ -12472,7 +12425,7 @@
               <a:buNone/>
             </a:pPr>
             <a:r>
-              <a:rPr lang="en-US" dirty="0" smtClean="0"/>
+              <a:rPr lang="en-US" dirty="0"/>
               <a:t>Kamran Ahmed 1921357042</a:t>
             </a:r>
           </a:p>
@@ -12492,19 +12445,19 @@
               <a:buNone/>
             </a:pPr>
             <a:r>
-              <a:rPr lang="en-US" dirty="0" err="1" smtClean="0"/>
+              <a:rPr lang="en-US" dirty="0" err="1"/>
               <a:t>Ifad</a:t>
             </a:r>
             <a:r>
-              <a:rPr lang="en-US" dirty="0" smtClean="0"/>
+              <a:rPr lang="en-US" dirty="0"/>
               <a:t> </a:t>
             </a:r>
             <a:r>
-              <a:rPr lang="en-US" dirty="0" err="1" smtClean="0"/>
+              <a:rPr lang="en-US" dirty="0" err="1"/>
               <a:t>Uz</a:t>
             </a:r>
             <a:r>
-              <a:rPr lang="en-US" dirty="0" smtClean="0"/>
+              <a:rPr lang="en-US" dirty="0"/>
               <a:t> Zaman 1921787642</a:t>
             </a:r>
           </a:p>
@@ -12586,18 +12539,6 @@
   <p:clrMapOvr>
     <a:masterClrMapping/>
   </p:clrMapOvr>
-  <mc:AlternateContent xmlns:mc="http://schemas.openxmlformats.org/markup-compatibility/2006">
-    <mc:Choice xmlns:p14="http://schemas.microsoft.com/office/powerpoint/2010/main" Requires="p14">
-      <p:transition spd="slow" p14:dur="3400">
-        <p14:reveal/>
-      </p:transition>
-    </mc:Choice>
-    <mc:Fallback>
-      <p:transition spd="slow">
-        <p:fade/>
-      </p:transition>
-    </mc:Fallback>
-  </mc:AlternateContent>
 </p:sld>
 </file>
 
@@ -12653,7 +12594,7 @@
               <a:buNone/>
             </a:pPr>
             <a:r>
-              <a:rPr lang="en-US" sz="3200" dirty="0" smtClean="0">
+              <a:rPr lang="en-US" sz="3200" dirty="0">
                 <a:solidFill>
                   <a:schemeClr val="accent2"/>
                 </a:solidFill>
@@ -12705,7 +12646,7 @@
               <a:buChar char="§"/>
             </a:pPr>
             <a:r>
-              <a:rPr lang="en-US" dirty="0" smtClean="0"/>
+              <a:rPr lang="en-US" dirty="0"/>
               <a:t>Introduction</a:t>
             </a:r>
           </a:p>
@@ -12722,7 +12663,7 @@
               <a:buChar char="§"/>
             </a:pPr>
             <a:r>
-              <a:rPr lang="en-US" dirty="0" smtClean="0"/>
+              <a:rPr lang="en-US" dirty="0"/>
               <a:t>Motivation and Description</a:t>
             </a:r>
           </a:p>
@@ -12739,7 +12680,7 @@
               <a:buChar char="§"/>
             </a:pPr>
             <a:r>
-              <a:rPr lang="en-US" dirty="0" smtClean="0"/>
+              <a:rPr lang="en-US" dirty="0"/>
               <a:t>Similar solutions</a:t>
             </a:r>
           </a:p>
@@ -12756,7 +12697,7 @@
               <a:buChar char="§"/>
             </a:pPr>
             <a:r>
-              <a:rPr lang="en-US" dirty="0" smtClean="0"/>
+              <a:rPr lang="en-US" dirty="0"/>
               <a:t>Our solution approach</a:t>
             </a:r>
           </a:p>
@@ -12773,7 +12714,7 @@
               <a:buChar char="§"/>
             </a:pPr>
             <a:r>
-              <a:rPr lang="en-US" dirty="0" smtClean="0"/>
+              <a:rPr lang="en-US" dirty="0"/>
               <a:t>Timeline</a:t>
             </a:r>
           </a:p>
@@ -12790,7 +12731,7 @@
               <a:buChar char="§"/>
             </a:pPr>
             <a:r>
-              <a:rPr lang="en-US" dirty="0" smtClean="0"/>
+              <a:rPr lang="en-US" dirty="0"/>
               <a:t>Roles and responsibilities</a:t>
             </a:r>
           </a:p>
@@ -12807,7 +12748,7 @@
               <a:buChar char="§"/>
             </a:pPr>
             <a:r>
-              <a:rPr lang="en-US" dirty="0" smtClean="0"/>
+              <a:rPr lang="en-US" dirty="0"/>
               <a:t>Conclusion</a:t>
             </a:r>
           </a:p>
@@ -12874,18 +12815,6 @@
   <p:clrMapOvr>
     <a:masterClrMapping/>
   </p:clrMapOvr>
-  <mc:AlternateContent xmlns:mc="http://schemas.openxmlformats.org/markup-compatibility/2006">
-    <mc:Choice xmlns:p14="http://schemas.microsoft.com/office/powerpoint/2010/main" Requires="p14">
-      <p:transition spd="slow" p14:dur="3400">
-        <p14:reveal/>
-      </p:transition>
-    </mc:Choice>
-    <mc:Fallback>
-      <p:transition spd="slow">
-        <p:fade/>
-      </p:transition>
-    </mc:Fallback>
-  </mc:AlternateContent>
 </p:sld>
 </file>
 
@@ -12927,10 +12856,9 @@
           <a:lstStyle/>
           <a:p>
             <a:r>
-              <a:rPr lang="en-US" dirty="0" smtClean="0"/>
+              <a:rPr lang="en-US" sz="3200" dirty="0"/>
               <a:t>Introduction</a:t>
             </a:r>
-            <a:endParaRPr lang="en-US" dirty="0"/>
           </a:p>
         </p:txBody>
       </p:sp>
@@ -12946,7 +12874,7 @@
         </p:nvSpPr>
         <p:spPr>
           <a:xfrm>
-            <a:off x="1075850" y="1003738"/>
+            <a:off x="1073700" y="903235"/>
             <a:ext cx="6996600" cy="3657599"/>
           </a:xfrm>
         </p:spPr>
@@ -12958,17 +12886,28 @@
               <a:buNone/>
             </a:pPr>
             <a:r>
-              <a:rPr lang="en-US" sz="1400" dirty="0" smtClean="0"/>
-              <a:t>What: </a:t>
+              <a:rPr lang="en-US" sz="1400" dirty="0"/>
+              <a:t>What is this project?</a:t>
             </a:r>
           </a:p>
           <a:p>
-            <a:pPr marL="101600" indent="0" algn="just">
-              <a:buNone/>
+            <a:pPr algn="just">
+              <a:buFont typeface="Arial" panose="020B0604020202020204" pitchFamily="34" charset="0"/>
+              <a:buChar char="•"/>
             </a:pPr>
             <a:r>
-              <a:rPr lang="en-US" sz="1000" dirty="0" smtClean="0"/>
-              <a:t>Family app is an android application geared towards families who wish to keep tabs on each other through location-based connections and enhanced, intuitive modes of open communication.</a:t>
+              <a:rPr lang="en-US" sz="1100" dirty="0"/>
+              <a:t>Family Android Application</a:t>
+            </a:r>
+          </a:p>
+          <a:p>
+            <a:pPr algn="just">
+              <a:buFont typeface="Arial" panose="020B0604020202020204" pitchFamily="34" charset="0"/>
+              <a:buChar char="•"/>
+            </a:pPr>
+            <a:r>
+              <a:rPr lang="en-US" sz="1100" dirty="0"/>
+              <a:t>Stay Connected with Family Members</a:t>
             </a:r>
           </a:p>
           <a:p>
@@ -12982,53 +12921,45 @@
               <a:buNone/>
             </a:pPr>
             <a:r>
-              <a:rPr lang="en-US" sz="1400" dirty="0" smtClean="0"/>
-              <a:t>Why:</a:t>
+              <a:rPr lang="en-US" sz="1400" dirty="0"/>
+              <a:t>Why are we doing it?</a:t>
             </a:r>
-            <a:endParaRPr lang="en-US" sz="1000" dirty="0" smtClean="0"/>
+            <a:endParaRPr lang="en-US" sz="1000" dirty="0"/>
+          </a:p>
+          <a:p>
+            <a:pPr algn="just">
+              <a:buFont typeface="Arial" panose="020B0604020202020204" pitchFamily="34" charset="0"/>
+              <a:buChar char="•"/>
+            </a:pPr>
+            <a:r>
+              <a:rPr lang="en-US" sz="1100" dirty="0"/>
+              <a:t>Family Safety </a:t>
+            </a:r>
+          </a:p>
+          <a:p>
+            <a:pPr algn="just">
+              <a:buFont typeface="Arial" panose="020B0604020202020204" pitchFamily="34" charset="0"/>
+              <a:buChar char="•"/>
+            </a:pPr>
+            <a:r>
+              <a:rPr lang="en-US" sz="1100" dirty="0"/>
+              <a:t>Digitization of Family Chores</a:t>
+            </a:r>
+          </a:p>
+          <a:p>
+            <a:pPr algn="just">
+              <a:buFont typeface="Arial" panose="020B0604020202020204" pitchFamily="34" charset="0"/>
+              <a:buChar char="•"/>
+            </a:pPr>
+            <a:r>
+              <a:rPr lang="en-US" sz="1100" dirty="0"/>
+              <a:t>Reduce Tension</a:t>
+            </a:r>
           </a:p>
           <a:p>
             <a:pPr marL="101600" indent="0" algn="just">
               <a:buNone/>
             </a:pPr>
-            <a:r>
-              <a:rPr lang="en-US" sz="1000" dirty="0" smtClean="0"/>
-              <a:t>Communication is key for any functioning family. In light of this, our family app wishes to bring </a:t>
-            </a:r>
-            <a:r>
-              <a:rPr lang="en-US" sz="1000" dirty="0"/>
-              <a:t>a </a:t>
-            </a:r>
-            <a:r>
-              <a:rPr lang="en-US" sz="1000" dirty="0" smtClean="0"/>
-              <a:t>revolutionized and digitalized platform that trickles down all such daily-to-daily communication within the family for a seamless and effective chain of open conversations, be it through text, voice, or interface. Moreover it will also ensure the safety of family members in case of any emergency.</a:t>
-            </a:r>
-            <a:endParaRPr lang="en-US" sz="1400" dirty="0" smtClean="0"/>
-          </a:p>
-          <a:p>
-            <a:pPr marL="101600" indent="0" algn="just">
-              <a:buNone/>
-            </a:pPr>
-            <a:endParaRPr lang="en-US" sz="1400" dirty="0"/>
-          </a:p>
-          <a:p>
-            <a:pPr marL="101600" indent="0" algn="just">
-              <a:buNone/>
-            </a:pPr>
-            <a:r>
-              <a:rPr lang="en-US" sz="1400" dirty="0" smtClean="0"/>
-              <a:t>How:</a:t>
-            </a:r>
-            <a:endParaRPr lang="en-US" sz="1000" dirty="0" smtClean="0"/>
-          </a:p>
-          <a:p>
-            <a:pPr marL="101600" indent="0" algn="just">
-              <a:buNone/>
-            </a:pPr>
-            <a:r>
-              <a:rPr lang="en-US" sz="1000" dirty="0" smtClean="0"/>
-              <a:t>The virtues of the said app is distributed over a wide range of domains, dispersed as cluster-free functionalities. </a:t>
-            </a:r>
             <a:endParaRPr lang="en-US" sz="1000" dirty="0"/>
           </a:p>
           <a:p>
@@ -13036,17 +12967,48 @@
               <a:buNone/>
             </a:pPr>
             <a:r>
-              <a:rPr lang="en-US" sz="1000" dirty="0" smtClean="0"/>
-              <a:t>From enabling family members to track each others’ location through mutual consent, or sending tasks and chores, to perform effective, life-saving stints like immediately responding to members’ emergencies through intuitive alert-and-respond calls and much more can simply be performed.</a:t>
+              <a:rPr lang="en-US" sz="1400" dirty="0"/>
+              <a:t>How:</a:t>
             </a:r>
           </a:p>
           <a:p>
-            <a:pPr marL="101600" indent="0" algn="just">
-              <a:buNone/>
+            <a:pPr algn="just">
+              <a:buFont typeface="Arial" panose="020B0604020202020204" pitchFamily="34" charset="0"/>
+              <a:buChar char="•"/>
             </a:pPr>
             <a:r>
-              <a:rPr lang="en-US" sz="1000" dirty="0" smtClean="0"/>
-              <a:t>Under the banner of the good graces of this application, an entire family’s communication and safety ecosystem can be devised. </a:t>
+              <a:rPr lang="en-US" sz="1100" dirty="0"/>
+              <a:t>See family member’s  live-location</a:t>
+            </a:r>
+          </a:p>
+          <a:p>
+            <a:pPr algn="just">
+              <a:buFont typeface="Arial" panose="020B0604020202020204" pitchFamily="34" charset="0"/>
+              <a:buChar char="•"/>
+            </a:pPr>
+            <a:r>
+              <a:rPr lang="en-US" sz="1100" dirty="0"/>
+              <a:t>Send tasks like grocery lists.</a:t>
+            </a:r>
+          </a:p>
+          <a:p>
+            <a:pPr algn="just">
+              <a:buFont typeface="Arial" panose="020B0604020202020204" pitchFamily="34" charset="0"/>
+              <a:buChar char="•"/>
+            </a:pPr>
+            <a:r>
+              <a:rPr lang="en-US" sz="1100" dirty="0"/>
+              <a:t>Send emergency alert to family members</a:t>
+            </a:r>
+          </a:p>
+          <a:p>
+            <a:pPr algn="just">
+              <a:buFont typeface="Arial" panose="020B0604020202020204" pitchFamily="34" charset="0"/>
+              <a:buChar char="•"/>
+            </a:pPr>
+            <a:r>
+              <a:rPr lang="en-US" sz="1100" dirty="0"/>
+              <a:t>Chat with family members </a:t>
             </a:r>
           </a:p>
         </p:txBody>
@@ -13093,18 +13055,6 @@
   <p:clrMapOvr>
     <a:masterClrMapping/>
   </p:clrMapOvr>
-  <mc:AlternateContent xmlns:mc="http://schemas.openxmlformats.org/markup-compatibility/2006">
-    <mc:Choice xmlns:p14="http://schemas.microsoft.com/office/powerpoint/2010/main" Requires="p14">
-      <p:transition spd="slow" p14:dur="3400">
-        <p14:reveal/>
-      </p:transition>
-    </mc:Choice>
-    <mc:Fallback>
-      <p:transition spd="slow">
-        <p:fade/>
-      </p:transition>
-    </mc:Fallback>
-  </mc:AlternateContent>
 </p:sld>
 </file>
 
@@ -13160,7 +13110,7 @@
               <a:buNone/>
             </a:pPr>
             <a:r>
-              <a:rPr lang="en-US" dirty="0" smtClean="0"/>
+              <a:rPr lang="en-US" dirty="0"/>
               <a:t>A man who doesn’t spend time with his family can never be a real man.</a:t>
             </a:r>
           </a:p>
@@ -13175,15 +13125,15 @@
               <a:buNone/>
             </a:pPr>
             <a:r>
-              <a:rPr lang="en-US" dirty="0" smtClean="0"/>
+              <a:rPr lang="en-US" dirty="0"/>
               <a:t>-Don Vito </a:t>
             </a:r>
             <a:r>
-              <a:rPr lang="en-US" dirty="0" err="1" smtClean="0"/>
+              <a:rPr lang="en-US" dirty="0" err="1"/>
               <a:t>Carleone</a:t>
             </a:r>
             <a:r>
-              <a:rPr lang="en-US" dirty="0" smtClean="0"/>
+              <a:rPr lang="en-US" dirty="0"/>
               <a:t>, The Godfather</a:t>
             </a:r>
             <a:endParaRPr dirty="0"/>
@@ -13237,18 +13187,6 @@
   <p:clrMapOvr>
     <a:masterClrMapping/>
   </p:clrMapOvr>
-  <mc:AlternateContent xmlns:mc="http://schemas.openxmlformats.org/markup-compatibility/2006">
-    <mc:Choice xmlns:p14="http://schemas.microsoft.com/office/powerpoint/2010/main" Requires="p14">
-      <p:transition spd="slow" p14:dur="3400">
-        <p14:reveal/>
-      </p:transition>
-    </mc:Choice>
-    <mc:Fallback>
-      <p:transition spd="slow">
-        <p:fade/>
-      </p:transition>
-    </mc:Fallback>
-  </mc:AlternateContent>
 </p:sld>
 </file>
 
@@ -13290,10 +13228,9 @@
           <a:lstStyle/>
           <a:p>
             <a:r>
-              <a:rPr lang="en-US" dirty="0" smtClean="0"/>
+              <a:rPr lang="en-US" sz="2800" dirty="0"/>
               <a:t>Motivation and Description</a:t>
             </a:r>
-            <a:endParaRPr lang="en-US" dirty="0"/>
           </a:p>
         </p:txBody>
       </p:sp>
@@ -13317,91 +13254,74 @@
           <a:bodyPr/>
           <a:lstStyle/>
           <a:p>
-            <a:pPr marL="101600" indent="0" algn="just">
-              <a:buNone/>
+            <a:pPr algn="just">
+              <a:lnSpc>
+                <a:spcPct val="250000"/>
+              </a:lnSpc>
+              <a:buFont typeface="Wingdings" panose="05000000000000000000" pitchFamily="2" charset="2"/>
+              <a:buChar char="Ø"/>
             </a:pPr>
             <a:r>
-              <a:rPr lang="en-US" sz="1000" dirty="0"/>
-              <a:t>The ability to track family members in times of need, to assign them household tasks, or to remind them of the urgent obligations and appointments - can all be a regular affair for any family, largely done through an unsystematic manner, primarily, through nuanced-filled phone calls and unreliable text messaging applications</a:t>
+              <a:rPr lang="en-US" sz="1200" dirty="0"/>
+              <a:t>Concern of Family Members.</a:t>
             </a:r>
+          </a:p>
+          <a:p>
+            <a:pPr algn="just">
+              <a:lnSpc>
+                <a:spcPct val="250000"/>
+              </a:lnSpc>
+              <a:buFont typeface="Wingdings" panose="05000000000000000000" pitchFamily="2" charset="2"/>
+              <a:buChar char="Ø"/>
+            </a:pPr>
             <a:r>
-              <a:rPr lang="en-US" sz="1000" dirty="0" smtClean="0"/>
-              <a:t>.</a:t>
+              <a:rPr lang="en-US" sz="1200" dirty="0"/>
+              <a:t>Sending Tasks.</a:t>
+            </a:r>
+          </a:p>
+          <a:p>
+            <a:pPr algn="just">
+              <a:lnSpc>
+                <a:spcPct val="250000"/>
+              </a:lnSpc>
+              <a:buFont typeface="Wingdings" panose="05000000000000000000" pitchFamily="2" charset="2"/>
+              <a:buChar char="Ø"/>
+            </a:pPr>
+            <a:r>
+              <a:rPr lang="en-US" sz="1200" dirty="0"/>
+              <a:t>Notifying of Obligations and Appointments.</a:t>
+            </a:r>
+          </a:p>
+          <a:p>
+            <a:pPr algn="just">
+              <a:lnSpc>
+                <a:spcPct val="250000"/>
+              </a:lnSpc>
+              <a:buFont typeface="Wingdings" panose="05000000000000000000" pitchFamily="2" charset="2"/>
+              <a:buChar char="Ø"/>
+            </a:pPr>
+            <a:r>
+              <a:rPr lang="en-US" sz="1200" dirty="0"/>
+              <a:t>Digitizing Family communication.</a:t>
+            </a:r>
+          </a:p>
+          <a:p>
+            <a:pPr algn="just">
+              <a:lnSpc>
+                <a:spcPct val="250000"/>
+              </a:lnSpc>
+              <a:buFont typeface="Wingdings" panose="05000000000000000000" pitchFamily="2" charset="2"/>
+              <a:buChar char="Ø"/>
+            </a:pPr>
+            <a:r>
+              <a:rPr lang="en-US" sz="1200" dirty="0"/>
+              <a:t>Emergency alerts of members.</a:t>
             </a:r>
           </a:p>
           <a:p>
             <a:pPr marL="101600" indent="0" algn="just">
               <a:buNone/>
             </a:pPr>
-            <a:r>
-              <a:rPr lang="en-US" sz="1000" dirty="0"/>
-              <a:t>With more households moving forward with having multiple working members in the family, it’s tough to relive the typical morning-family-breakfast; as each clock out and in from home at different hours of the day. Where, when, and who - all the appointments, tasks, and chores can all be challenging to keep track of - especially when all members of the family are in a race with their time-constrained routines</a:t>
-            </a:r>
-            <a:r>
-              <a:rPr lang="en-US" sz="1000" dirty="0" smtClean="0"/>
-              <a:t>.</a:t>
-            </a:r>
-          </a:p>
-          <a:p>
-            <a:pPr marL="101600" indent="0" algn="just">
-              <a:buNone/>
-            </a:pPr>
-            <a:r>
-              <a:rPr lang="en-US" sz="1000" dirty="0"/>
-              <a:t>We took note of this, and consequently attempted </a:t>
-            </a:r>
-            <a:r>
-              <a:rPr lang="en-US" sz="1000" dirty="0" smtClean="0"/>
-              <a:t>to solution </a:t>
-            </a:r>
-            <a:r>
-              <a:rPr lang="en-US" sz="1000" dirty="0"/>
-              <a:t>this growingly noticeable predicament.</a:t>
-            </a:r>
-          </a:p>
-          <a:p>
-            <a:pPr marL="101600" indent="0" algn="just">
-              <a:buNone/>
-            </a:pPr>
-            <a:r>
-              <a:rPr lang="en-US" sz="1000" dirty="0" smtClean="0"/>
-              <a:t>The </a:t>
-            </a:r>
-            <a:r>
-              <a:rPr lang="en-US" sz="1000" dirty="0"/>
-              <a:t>absence of a poor mutual and open communication system between all members of a family in a digital platform led us to theorize an elucidated solution through our proposed application, </a:t>
-            </a:r>
-            <a:r>
-              <a:rPr lang="en-US" sz="1000" dirty="0" smtClean="0"/>
-              <a:t>Family App.</a:t>
-            </a:r>
-            <a:endParaRPr lang="en-US" sz="1000" dirty="0"/>
-          </a:p>
-          <a:p>
-            <a:pPr marL="101600" indent="0" algn="just">
-              <a:buNone/>
-            </a:pPr>
-            <a:r>
-              <a:rPr lang="en-US" sz="1000" dirty="0"/>
-              <a:t>Oriented towards intuition, hassle-free quick fixes, and smart organization, the app’s main essence is to assist families to be on track and, for example, not forget their child’s next doctor’s appointment, or finding reassurance through the app - by knowing their kid doing just fine whilst coming home from class, through live location feedback</a:t>
-            </a:r>
-            <a:r>
-              <a:rPr lang="en-US" sz="1000" dirty="0" smtClean="0"/>
-              <a:t>.</a:t>
-            </a:r>
-          </a:p>
-          <a:p>
-            <a:pPr marL="101600" indent="0" algn="just">
-              <a:buNone/>
-            </a:pPr>
-            <a:r>
-              <a:rPr lang="en-US" sz="1000" dirty="0"/>
-              <a:t>All in all, the application will be equipped with multiple, effective features to help us navigate and perform the highlighted activities as expressed: Tracking members through location sharing, creating and assigning tasks, text-based chatting, a One-Tap-Alert system for calls of distress, last-active statuses, publishing family notices and reminders, and many </a:t>
-            </a:r>
-            <a:r>
-              <a:rPr lang="en-US" sz="1000" dirty="0" smtClean="0"/>
-              <a:t>more.</a:t>
-            </a:r>
             <a:endParaRPr lang="en-US" sz="1000" dirty="0"/>
           </a:p>
         </p:txBody>
@@ -13448,18 +13368,6 @@
   <p:clrMapOvr>
     <a:masterClrMapping/>
   </p:clrMapOvr>
-  <mc:AlternateContent xmlns:mc="http://schemas.openxmlformats.org/markup-compatibility/2006">
-    <mc:Choice xmlns:p14="http://schemas.microsoft.com/office/powerpoint/2010/main" Requires="p14">
-      <p:transition spd="slow" p14:dur="3400">
-        <p14:reveal/>
-      </p:transition>
-    </mc:Choice>
-    <mc:Fallback>
-      <p:transition spd="slow">
-        <p:fade/>
-      </p:transition>
-    </mc:Fallback>
-  </mc:AlternateContent>
 </p:sld>
 </file>
 
@@ -13496,10 +13404,9 @@
           <a:lstStyle/>
           <a:p>
             <a:r>
-              <a:rPr lang="en-US" dirty="0" smtClean="0"/>
+              <a:rPr lang="en-US" sz="2800" dirty="0"/>
               <a:t>Similar Solutions</a:t>
             </a:r>
-            <a:endParaRPr lang="en-US" dirty="0"/>
           </a:p>
         </p:txBody>
       </p:sp>
@@ -13536,27 +13443,18 @@
             </a:r>
             <a:r>
               <a:rPr lang="en-US" sz="1200" dirty="0"/>
-              <a:t>, we did find some apps with </a:t>
-            </a:r>
-            <a:r>
-              <a:rPr lang="en-US" sz="1200" dirty="0" smtClean="0"/>
-              <a:t>motivations somewhat </a:t>
-            </a:r>
-            <a:r>
-              <a:rPr lang="en-US" sz="1200" dirty="0"/>
-              <a:t>similar to ours’.</a:t>
+              <a:t>, we did find some apps with motivations somewhat similar to ours’.</a:t>
             </a:r>
           </a:p>
           <a:p>
-            <a:pPr marL="101600" indent="0" algn="just">
-              <a:buNone/>
+            <a:pPr marL="330200" indent="-228600" algn="just">
+              <a:lnSpc>
+                <a:spcPct val="200000"/>
+              </a:lnSpc>
+              <a:buAutoNum type="arabicPeriod"/>
             </a:pPr>
             <a:r>
-              <a:rPr lang="en-US" sz="1200" dirty="0" smtClean="0"/>
-              <a:t>1. </a:t>
-            </a:r>
-            <a:r>
-              <a:rPr lang="en-US" sz="1200" dirty="0" err="1" smtClean="0"/>
+              <a:rPr lang="en-US" sz="1200" dirty="0" err="1"/>
               <a:t>Bachao</a:t>
             </a:r>
             <a:r>
@@ -13573,24 +13471,19 @@
             </a:r>
             <a:r>
               <a:rPr lang="en-US" sz="1200" dirty="0"/>
-              <a:t>] An </a:t>
-            </a:r>
-            <a:r>
-              <a:rPr lang="en-US" sz="1200" dirty="0" smtClean="0"/>
-              <a:t>app aimed to reduce rape incidents in our country by emergency response system. But our proposed system in addition to that does much more.</a:t>
+              <a:t>] </a:t>
             </a:r>
           </a:p>
           <a:p>
-            <a:pPr marL="101600" indent="0" algn="just">
-              <a:buNone/>
+            <a:pPr marL="330200" indent="-228600" algn="just">
+              <a:lnSpc>
+                <a:spcPct val="200000"/>
+              </a:lnSpc>
+              <a:buAutoNum type="arabicPeriod"/>
             </a:pPr>
             <a:r>
-              <a:rPr lang="en-US" sz="1200" dirty="0" smtClean="0"/>
-              <a:t>2. Microsoft </a:t>
-            </a:r>
-            <a:r>
               <a:rPr lang="en-US" sz="1200" dirty="0"/>
-              <a:t>Family Safety: [</a:t>
+              <a:t>Microsoft Family Safety: [</a:t>
             </a:r>
             <a:r>
               <a:rPr lang="en-US" sz="1200" dirty="0">
@@ -13598,29 +13491,20 @@
                   <a:schemeClr val="accent2"/>
                 </a:solidFill>
               </a:rPr>
-              <a:t>https://</a:t>
+              <a:t>https://www.microsoft.com/en-us/microsoft-365/family-safety</a:t>
             </a:r>
             <a:r>
-              <a:rPr lang="en-US" sz="1200" dirty="0" smtClean="0">
-                <a:solidFill>
-                  <a:schemeClr val="accent2"/>
-                </a:solidFill>
-              </a:rPr>
-              <a:t>www.microsoft.com/en-us/microsoft-365/family-safety</a:t>
-            </a:r>
-            <a:r>
-              <a:rPr lang="en-US" sz="1200" dirty="0" smtClean="0"/>
-              <a:t>] This system mostly focuses on parental control rather than family communication and management. Despite it has many features similar to ours, it however doesn’t have any emergency response system and storage system.</a:t>
+              <a:rPr lang="en-US" sz="1200" dirty="0"/>
+              <a:t>] </a:t>
             </a:r>
           </a:p>
           <a:p>
-            <a:pPr marL="101600" indent="0" algn="just">
-              <a:buNone/>
+            <a:pPr marL="330200" indent="-228600" algn="just">
+              <a:lnSpc>
+                <a:spcPct val="200000"/>
+              </a:lnSpc>
+              <a:buAutoNum type="arabicPeriod"/>
             </a:pPr>
-            <a:r>
-              <a:rPr lang="en-US" sz="1200" dirty="0" smtClean="0"/>
-              <a:t>3. </a:t>
-            </a:r>
             <a:r>
               <a:rPr lang="en-US" sz="1200" dirty="0"/>
               <a:t>Google Family Link: [</a:t>
@@ -13634,18 +13518,9 @@
               <a:t>https://families.google.com/families</a:t>
             </a:r>
             <a:r>
-              <a:rPr lang="en-US" sz="1200" dirty="0" smtClean="0"/>
-              <a:t>] In spite of having similar name, it actually works quite differently than our proposed system. Google family mainly integrates different google services among the family members.</a:t>
+              <a:rPr lang="en-US" sz="1200" dirty="0"/>
+              <a:t>]</a:t>
             </a:r>
-          </a:p>
-          <a:p>
-            <a:pPr marL="101600" indent="0">
-              <a:buNone/>
-            </a:pPr>
-            <a:endParaRPr lang="en-US" sz="1200" dirty="0" smtClean="0"/>
-          </a:p>
-          <a:p>
-            <a:endParaRPr lang="en-US" dirty="0"/>
           </a:p>
         </p:txBody>
       </p:sp>
@@ -13691,25 +13566,6 @@
   <p:clrMapOvr>
     <a:masterClrMapping/>
   </p:clrMapOvr>
-  <mc:AlternateContent xmlns:mc="http://schemas.openxmlformats.org/markup-compatibility/2006">
-    <mc:Choice xmlns:p14="http://schemas.microsoft.com/office/powerpoint/2010/main" Requires="p14">
-      <p:transition spd="slow" p14:dur="3400">
-        <p14:reveal/>
-      </p:transition>
-    </mc:Choice>
-    <mc:Fallback>
-      <p:transition spd="slow">
-        <p:fade/>
-      </p:transition>
-    </mc:Fallback>
-  </mc:AlternateContent>
-  <p:timing>
-    <p:tnLst>
-      <p:par>
-        <p:cTn id="1" dur="indefinite" restart="never" nodeType="tmRoot"/>
-      </p:par>
-    </p:tnLst>
-  </p:timing>
 </p:sld>
 </file>
 
@@ -13765,7 +13621,7 @@
               <a:buNone/>
             </a:pPr>
             <a:r>
-              <a:rPr lang="en" sz="9000" dirty="0" smtClean="0"/>
+              <a:rPr lang="en" sz="9000" dirty="0"/>
               <a:t>Our Solution</a:t>
             </a:r>
             <a:endParaRPr sz="9000" dirty="0"/>
@@ -13807,7 +13663,7 @@
               <a:buNone/>
             </a:pPr>
             <a:r>
-              <a:rPr lang="en-US" sz="1800" dirty="0" smtClean="0">
+              <a:rPr lang="en-US" sz="1800" dirty="0">
                 <a:solidFill>
                   <a:schemeClr val="accent3"/>
                 </a:solidFill>
@@ -16392,25 +16248,6 @@
   <p:clrMapOvr>
     <a:masterClrMapping/>
   </p:clrMapOvr>
-  <mc:AlternateContent xmlns:mc="http://schemas.openxmlformats.org/markup-compatibility/2006">
-    <mc:Choice xmlns:p14="http://schemas.microsoft.com/office/powerpoint/2010/main" Requires="p14">
-      <p:transition spd="slow" p14:dur="3400">
-        <p14:reveal/>
-      </p:transition>
-    </mc:Choice>
-    <mc:Fallback>
-      <p:transition spd="slow">
-        <p:fade/>
-      </p:transition>
-    </mc:Fallback>
-  </mc:AlternateContent>
-  <p:timing>
-    <p:tnLst>
-      <p:par>
-        <p:cTn id="1" dur="indefinite" restart="never" nodeType="tmRoot"/>
-      </p:par>
-    </p:tnLst>
-  </p:timing>
 </p:sld>
 </file>
 
@@ -16452,10 +16289,9 @@
           <a:lstStyle/>
           <a:p>
             <a:r>
-              <a:rPr lang="en-US" dirty="0" smtClean="0"/>
+              <a:rPr lang="en-US" sz="2800" dirty="0"/>
               <a:t>Approach to solution</a:t>
             </a:r>
-            <a:endParaRPr lang="en-US" dirty="0"/>
           </a:p>
         </p:txBody>
       </p:sp>
@@ -16483,7 +16319,7 @@
               <a:buNone/>
             </a:pPr>
             <a:r>
-              <a:rPr lang="en-US" sz="1400" dirty="0" smtClean="0"/>
+              <a:rPr lang="en-US" sz="1400" dirty="0"/>
               <a:t>The scenario we already talked about we would like to address it by implementing,</a:t>
             </a:r>
           </a:p>
@@ -16492,7 +16328,7 @@
               <a:buNone/>
             </a:pPr>
             <a:r>
-              <a:rPr lang="en-US" sz="1400" dirty="0" smtClean="0"/>
+              <a:rPr lang="en-US" sz="1400" dirty="0"/>
               <a:t>Features:</a:t>
             </a:r>
           </a:p>
@@ -16502,7 +16338,7 @@
               <a:buChar char="•"/>
             </a:pPr>
             <a:r>
-              <a:rPr lang="en-US" sz="1000" dirty="0" smtClean="0"/>
+              <a:rPr lang="en-US" sz="1000" dirty="0"/>
               <a:t>Chat</a:t>
             </a:r>
           </a:p>
@@ -16512,7 +16348,7 @@
               <a:buChar char="•"/>
             </a:pPr>
             <a:r>
-              <a:rPr lang="en-US" sz="1000" dirty="0" smtClean="0"/>
+              <a:rPr lang="en-US" sz="1000" dirty="0"/>
               <a:t>To-Do tasks</a:t>
             </a:r>
           </a:p>
@@ -16522,7 +16358,7 @@
               <a:buChar char="•"/>
             </a:pPr>
             <a:r>
-              <a:rPr lang="en-US" sz="1000" dirty="0" smtClean="0"/>
+              <a:rPr lang="en-US" sz="1000" dirty="0"/>
               <a:t>Live location sharing</a:t>
             </a:r>
           </a:p>
@@ -16532,7 +16368,7 @@
               <a:buChar char="•"/>
             </a:pPr>
             <a:r>
-              <a:rPr lang="en-US" sz="1000" dirty="0" smtClean="0"/>
+              <a:rPr lang="en-US" sz="1000" dirty="0"/>
               <a:t>Last active status with location and timestamp</a:t>
             </a:r>
           </a:p>
@@ -16542,7 +16378,7 @@
               <a:buChar char="•"/>
             </a:pPr>
             <a:r>
-              <a:rPr lang="en-US" sz="1000" dirty="0" smtClean="0"/>
+              <a:rPr lang="en-US" sz="1000" dirty="0"/>
               <a:t>Storage facility for prominent family docs</a:t>
             </a:r>
           </a:p>
@@ -16552,7 +16388,7 @@
               <a:buChar char="•"/>
             </a:pPr>
             <a:r>
-              <a:rPr lang="en-US" sz="1000" dirty="0" smtClean="0"/>
+              <a:rPr lang="en-US" sz="1000" dirty="0"/>
               <a:t>One-Tap-Alert system to notify all members during the wake of an emergency</a:t>
             </a:r>
           </a:p>
@@ -16562,7 +16398,7 @@
               <a:buChar char="•"/>
             </a:pPr>
             <a:r>
-              <a:rPr lang="en-US" sz="1000" dirty="0" smtClean="0"/>
+              <a:rPr lang="en-US" sz="1000" dirty="0"/>
               <a:t>One-Tap-Call to emergency services i.e. ambulance, police</a:t>
             </a:r>
           </a:p>
@@ -16571,12 +16407,12 @@
               <a:buNone/>
             </a:pPr>
             <a:r>
-              <a:rPr lang="en-US" sz="1000" dirty="0" smtClean="0">
+              <a:rPr lang="en-US" sz="1000" dirty="0">
                 <a:solidFill>
                   <a:srgbClr val="FF0000"/>
                 </a:solidFill>
               </a:rPr>
-              <a:t>The features mentioned here are the primary ones and will not be limited to these. As we go ahead with the project we will continue to look for more features to add!</a:t>
+              <a:t>More features to come…</a:t>
             </a:r>
           </a:p>
           <a:p>
@@ -16584,7 +16420,7 @@
               <a:buNone/>
             </a:pPr>
             <a:r>
-              <a:rPr lang="en-US" sz="1100" dirty="0" smtClean="0">
+              <a:rPr lang="en-US" sz="1100" dirty="0">
                 <a:solidFill>
                   <a:schemeClr val="tx1"/>
                 </a:solidFill>
@@ -16597,12 +16433,12 @@
               <a:buNone/>
             </a:pPr>
             <a:r>
-              <a:rPr lang="en-US" sz="1100" dirty="0" smtClean="0">
+              <a:rPr lang="en-US" sz="1100" dirty="0">
                 <a:solidFill>
                   <a:schemeClr val="tx1"/>
                 </a:solidFill>
               </a:rPr>
-              <a:t>Software Techs and development platforms: Flutter, Firebase, Slack, Android Studio, Visual Studio, GitHub etc.</a:t>
+              <a:t>Software &amp; development platforms: Flutter, Firebase, Slack, Android Studio, Visual Studio, GitHub etc.</a:t>
             </a:r>
           </a:p>
           <a:p>
@@ -16610,15 +16446,15 @@
               <a:buNone/>
             </a:pPr>
             <a:r>
-              <a:rPr lang="en-US" sz="1100" dirty="0" smtClean="0">
+              <a:rPr lang="en-US" sz="1100" dirty="0">
                 <a:solidFill>
                   <a:schemeClr val="tx1"/>
                 </a:solidFill>
               </a:rPr>
-              <a:t>Languages: Dart, Java, Java Script etc</a:t>
+              <a:t>Languages: Dart, Java, etc</a:t>
             </a:r>
             <a:r>
-              <a:rPr lang="en-US" sz="1200" dirty="0" smtClean="0">
+              <a:rPr lang="en-US" sz="1200" dirty="0">
                 <a:solidFill>
                   <a:schemeClr val="tx1"/>
                 </a:solidFill>
@@ -16631,7 +16467,7 @@
               <a:buFont typeface="Arial" panose="020B0604020202020204" pitchFamily="34" charset="0"/>
               <a:buChar char="•"/>
             </a:pPr>
-            <a:endParaRPr lang="en-US" sz="1000" dirty="0" smtClean="0"/>
+            <a:endParaRPr lang="en-US" sz="1000" dirty="0"/>
           </a:p>
         </p:txBody>
       </p:sp>
@@ -16677,25 +16513,6 @@
   <p:clrMapOvr>
     <a:masterClrMapping/>
   </p:clrMapOvr>
-  <mc:AlternateContent xmlns:mc="http://schemas.openxmlformats.org/markup-compatibility/2006">
-    <mc:Choice xmlns:p14="http://schemas.microsoft.com/office/powerpoint/2010/main" Requires="p14">
-      <p:transition spd="slow" p14:dur="3400">
-        <p14:reveal/>
-      </p:transition>
-    </mc:Choice>
-    <mc:Fallback>
-      <p:transition spd="slow">
-        <p:fade/>
-      </p:transition>
-    </mc:Fallback>
-  </mc:AlternateContent>
-  <p:timing>
-    <p:tnLst>
-      <p:par>
-        <p:cTn id="1" dur="indefinite" restart="never" nodeType="tmRoot"/>
-      </p:par>
-    </p:tnLst>
-  </p:timing>
 </p:sld>
 </file>
 

</xml_diff>